<commit_message>
Recommendation to Improve account security added.
Error capture rate of 9 % is calculated and recommendation added.
</commit_message>
<xml_diff>
--- a/Capstone_Fraud_Detection/updated_Capstone_Fraud_Detection.pptx
+++ b/Capstone_Fraud_Detection/updated_Capstone_Fraud_Detection.pptx
@@ -5,7 +5,7 @@
     <p:sldMasterId id="2147483660" r:id="rId4"/>
   </p:sldMasterIdLst>
   <p:notesMasterIdLst>
-    <p:notesMasterId r:id="rId32"/>
+    <p:notesMasterId r:id="rId33"/>
   </p:notesMasterIdLst>
   <p:sldIdLst>
     <p:sldId id="2561" r:id="rId5"/>
@@ -30,11 +30,12 @@
     <p:sldId id="2571" r:id="rId24"/>
     <p:sldId id="2582" r:id="rId25"/>
     <p:sldId id="2572" r:id="rId26"/>
-    <p:sldId id="2589" r:id="rId27"/>
-    <p:sldId id="2591" r:id="rId28"/>
-    <p:sldId id="2573" r:id="rId29"/>
-    <p:sldId id="2574" r:id="rId30"/>
-    <p:sldId id="2587" r:id="rId31"/>
+    <p:sldId id="2573" r:id="rId27"/>
+    <p:sldId id="2592" r:id="rId28"/>
+    <p:sldId id="2589" r:id="rId29"/>
+    <p:sldId id="2591" r:id="rId30"/>
+    <p:sldId id="2574" r:id="rId31"/>
+    <p:sldId id="2587" r:id="rId32"/>
   </p:sldIdLst>
   <p:sldSz cx="12192000" cy="6858000"/>
   <p:notesSz cx="6858000" cy="9144000"/>
@@ -176,13 +177,14 @@
             <p14:sldId id="2571"/>
             <p14:sldId id="2582"/>
             <p14:sldId id="2572"/>
-            <p14:sldId id="2589"/>
-            <p14:sldId id="2591"/>
           </p14:sldIdLst>
         </p14:section>
         <p14:section name="Conclusion" id="{C34BD562-885C-4B0D-AFB1-7C82EF1E4546}">
           <p14:sldIdLst>
             <p14:sldId id="2573"/>
+            <p14:sldId id="2592"/>
+            <p14:sldId id="2589"/>
+            <p14:sldId id="2591"/>
             <p14:sldId id="2574"/>
             <p14:sldId id="2587"/>
           </p14:sldIdLst>
@@ -3842,7 +3844,7 @@
           </a:lstStyle>
           <a:p>
             <a:fld id="{51193DB5-F704-4A9E-9221-0430EEEB421D}" type="datetimeFigureOut">
-              <a:t>12/7/2025</a:t>
+              <a:t>12/9/2025</a:t>
             </a:fld>
             <a:endParaRPr lang="en-US"/>
           </a:p>
@@ -5059,7 +5061,7 @@
           <a:lstStyle/>
           <a:p>
             <a:fld id="{B2D393C4-0CA9-4C41-AE61-388330E2A571}" type="slidenum">
-              <a:t>25</a:t>
+              <a:t>23</a:t>
             </a:fld>
             <a:endParaRPr lang="en-US"/>
           </a:p>
@@ -5149,7 +5151,7 @@
           <a:lstStyle/>
           <a:p>
             <a:fld id="{B2D393C4-0CA9-4C41-AE61-388330E2A571}" type="slidenum">
-              <a:t>26</a:t>
+              <a:t>27</a:t>
             </a:fld>
             <a:endParaRPr lang="en-US"/>
           </a:p>
@@ -5353,7 +5355,7 @@
           <a:lstStyle/>
           <a:p>
             <a:fld id="{B2D393C4-0CA9-4C41-AE61-388330E2A571}" type="slidenum">
-              <a:t>27</a:t>
+              <a:t>28</a:t>
             </a:fld>
             <a:endParaRPr lang="en-US"/>
           </a:p>
@@ -6622,7 +6624,7 @@
           <a:p>
             <a:fld id="{8AF2F4EA-388B-424B-AC17-965C10DAF675}" type="datetime2">
               <a:rPr lang="en-US" smtClean="0"/>
-              <a:t>Sunday, December 7, 2025</a:t>
+              <a:t>Tuesday, December 9, 2025</a:t>
             </a:fld>
             <a:endParaRPr lang="en-US"/>
           </a:p>
@@ -7241,7 +7243,7 @@
           <a:p>
             <a:fld id="{A5F6D2C8-34B4-4D49-8BA1-BACB1E5E91D7}" type="datetime2">
               <a:rPr lang="en-US" smtClean="0"/>
-              <a:t>Sunday, December 7, 2025</a:t>
+              <a:t>Tuesday, December 9, 2025</a:t>
             </a:fld>
             <a:endParaRPr lang="en-US"/>
           </a:p>
@@ -7789,7 +7791,7 @@
           <a:p>
             <a:fld id="{07FA98E2-6F7F-4A51-8E1F-EB59A50F0269}" type="datetime2">
               <a:rPr lang="en-US" smtClean="0"/>
-              <a:t>Sunday, December 7, 2025</a:t>
+              <a:t>Tuesday, December 9, 2025</a:t>
             </a:fld>
             <a:endParaRPr lang="en-US"/>
           </a:p>
@@ -8236,7 +8238,7 @@
           <a:p>
             <a:fld id="{150BB71E-4F8F-41C0-A92F-F3C4EFE8AC7B}" type="datetime2">
               <a:rPr lang="en-US" smtClean="0"/>
-              <a:t>Sunday, December 7, 2025</a:t>
+              <a:t>Tuesday, December 9, 2025</a:t>
             </a:fld>
             <a:endParaRPr lang="en-US"/>
           </a:p>
@@ -8477,7 +8479,7 @@
           <a:p>
             <a:fld id="{38963436-5FD3-4DBA-BA14-7BB2834C5EC5}" type="datetime2">
               <a:rPr lang="en-US" smtClean="0"/>
-              <a:t>Sunday, December 7, 2025</a:t>
+              <a:t>Tuesday, December 9, 2025</a:t>
             </a:fld>
             <a:endParaRPr lang="en-US"/>
           </a:p>
@@ -8713,7 +8715,7 @@
           <a:p>
             <a:fld id="{F2DB3D6C-C357-4A18-98FF-C5DAE1A10B46}" type="datetime2">
               <a:rPr lang="en-US" smtClean="0"/>
-              <a:t>Sunday, December 7, 2025</a:t>
+              <a:t>Tuesday, December 9, 2025</a:t>
             </a:fld>
             <a:endParaRPr lang="en-US"/>
           </a:p>
@@ -8949,7 +8951,7 @@
           <a:p>
             <a:fld id="{76848E0B-8A0C-48E4-ADBA-2AC6A8CE7CBF}" type="datetime2">
               <a:rPr lang="en-US" smtClean="0"/>
-              <a:t>Sunday, December 7, 2025</a:t>
+              <a:t>Tuesday, December 9, 2025</a:t>
             </a:fld>
             <a:endParaRPr lang="en-US"/>
           </a:p>
@@ -9185,7 +9187,7 @@
           <a:p>
             <a:fld id="{2CBDCCA7-F1A7-4374-A53E-DDBF6669B4DA}" type="datetime2">
               <a:rPr lang="en-US" smtClean="0"/>
-              <a:t>Sunday, December 7, 2025</a:t>
+              <a:t>Tuesday, December 9, 2025</a:t>
             </a:fld>
             <a:endParaRPr lang="en-US"/>
           </a:p>
@@ -9437,7 +9439,7 @@
           <a:p>
             <a:fld id="{7A4E53C8-4441-4494-9A33-9A60A8C010FF}" type="datetime2">
               <a:rPr lang="en-US" smtClean="0"/>
-              <a:t>Sunday, December 7, 2025</a:t>
+              <a:t>Tuesday, December 9, 2025</a:t>
             </a:fld>
             <a:endParaRPr lang="en-US"/>
           </a:p>
@@ -9883,7 +9885,7 @@
           <a:p>
             <a:fld id="{7C27853E-A83C-4AE4-BB8D-D1C2F70D8524}" type="datetime2">
               <a:rPr lang="en-US" smtClean="0"/>
-              <a:t>Sunday, December 7, 2025</a:t>
+              <a:t>Tuesday, December 9, 2025</a:t>
             </a:fld>
             <a:endParaRPr lang="en-US"/>
           </a:p>
@@ -10290,7 +10292,7 @@
           <a:p>
             <a:fld id="{92BDBDAA-674F-41A5-9B7A-63B7C6B4BF31}" type="datetime2">
               <a:rPr lang="en-US" smtClean="0"/>
-              <a:t>Sunday, December 7, 2025</a:t>
+              <a:t>Tuesday, December 9, 2025</a:t>
             </a:fld>
             <a:endParaRPr lang="en-US"/>
           </a:p>
@@ -10511,7 +10513,7 @@
           <a:p>
             <a:fld id="{8E7ACF9F-8FDB-4ADC-A9FD-4B179047B36A}" type="datetime2">
               <a:rPr lang="en-US" smtClean="0"/>
-              <a:t>Sunday, December 7, 2025</a:t>
+              <a:t>Tuesday, December 9, 2025</a:t>
             </a:fld>
             <a:endParaRPr lang="en-US"/>
           </a:p>
@@ -10909,7 +10911,7 @@
           <a:p>
             <a:fld id="{15508136-2BE5-4DEB-BFFF-CA82AE75DA81}" type="datetime2">
               <a:rPr lang="en-US" smtClean="0"/>
-              <a:t>Sunday, December 7, 2025</a:t>
+              <a:t>Tuesday, December 9, 2025</a:t>
             </a:fld>
             <a:endParaRPr lang="en-US"/>
           </a:p>
@@ -11307,7 +11309,7 @@
           <a:p>
             <a:fld id="{38CA907A-57F4-4BE4-B9CF-66B2A48FC3D2}" type="datetime2">
               <a:rPr lang="en-US" smtClean="0"/>
-              <a:t>Sunday, December 7, 2025</a:t>
+              <a:t>Tuesday, December 9, 2025</a:t>
             </a:fld>
             <a:endParaRPr lang="en-US"/>
           </a:p>
@@ -11719,7 +11721,7 @@
           <a:p>
             <a:fld id="{F8C0C47F-6992-403B-A8BD-DAD08522434F}" type="datetime2">
               <a:rPr lang="en-US" smtClean="0"/>
-              <a:t>Sunday, December 7, 2025</a:t>
+              <a:t>Tuesday, December 9, 2025</a:t>
             </a:fld>
             <a:endParaRPr lang="en-US"/>
           </a:p>
@@ -12109,7 +12111,7 @@
           <a:p>
             <a:fld id="{4EE2BF70-051F-4182-B873-1FBEE890188B}" type="datetime2">
               <a:rPr lang="en-US" smtClean="0"/>
-              <a:t>Sunday, December 7, 2025</a:t>
+              <a:t>Tuesday, December 9, 2025</a:t>
             </a:fld>
             <a:endParaRPr lang="en-US"/>
           </a:p>
@@ -12517,7 +12519,7 @@
           <a:p>
             <a:fld id="{2B29163A-D4FD-4B13-B760-29FEA46D26A0}" type="datetime2">
               <a:rPr lang="en-US" smtClean="0"/>
-              <a:t>Sunday, December 7, 2025</a:t>
+              <a:t>Tuesday, December 9, 2025</a:t>
             </a:fld>
             <a:endParaRPr lang="en-US"/>
           </a:p>
@@ -12925,7 +12927,7 @@
           <a:p>
             <a:fld id="{BF31E3F0-C597-454C-9C6A-C05C00896517}" type="datetime2">
               <a:rPr lang="en-US" smtClean="0"/>
-              <a:t>Sunday, December 7, 2025</a:t>
+              <a:t>Tuesday, December 9, 2025</a:t>
             </a:fld>
             <a:endParaRPr lang="en-US"/>
           </a:p>
@@ -13333,7 +13335,7 @@
           <a:p>
             <a:fld id="{64C03E46-357C-41AA-B644-5D238512659D}" type="datetime2">
               <a:rPr lang="en-US" smtClean="0"/>
-              <a:t>Sunday, December 7, 2025</a:t>
+              <a:t>Tuesday, December 9, 2025</a:t>
             </a:fld>
             <a:endParaRPr lang="en-US"/>
           </a:p>
@@ -13745,7 +13747,7 @@
           <a:p>
             <a:fld id="{F7317806-C1A4-4898-A392-58092F2DAC1E}" type="datetime2">
               <a:rPr lang="en-US" smtClean="0"/>
-              <a:t>Sunday, December 7, 2025</a:t>
+              <a:t>Tuesday, December 9, 2025</a:t>
             </a:fld>
             <a:endParaRPr lang="en-US"/>
           </a:p>
@@ -14162,7 +14164,7 @@
           <a:p>
             <a:fld id="{5EBE550A-BFEE-40D6-A0EE-F4BD2148E98A}" type="datetime2">
               <a:rPr lang="en-US" smtClean="0"/>
-              <a:t>Sunday, December 7, 2025</a:t>
+              <a:t>Tuesday, December 9, 2025</a:t>
             </a:fld>
             <a:endParaRPr lang="en-US"/>
           </a:p>
@@ -14590,7 +14592,7 @@
           <a:p>
             <a:fld id="{3F60DE63-5C97-4D17-AD5B-559BE78F8C6E}" type="datetime2">
               <a:rPr lang="en-US" smtClean="0"/>
-              <a:t>Sunday, December 7, 2025</a:t>
+              <a:t>Tuesday, December 9, 2025</a:t>
             </a:fld>
             <a:endParaRPr lang="en-US"/>
           </a:p>
@@ -15266,7 +15268,7 @@
           <a:p>
             <a:fld id="{3D4AF38C-0923-462D-8E8F-DFB1FB3CD655}" type="datetime2">
               <a:rPr lang="en-US" smtClean="0"/>
-              <a:t>Sunday, December 7, 2025</a:t>
+              <a:t>Tuesday, December 9, 2025</a:t>
             </a:fld>
             <a:endParaRPr lang="en-US"/>
           </a:p>
@@ -15680,7 +15682,7 @@
           <a:p>
             <a:fld id="{EC3B1CEA-5D85-42AB-95DF-BF2F02172CA4}" type="datetime2">
               <a:rPr lang="en-US" smtClean="0"/>
-              <a:t>Sunday, December 7, 2025</a:t>
+              <a:t>Tuesday, December 9, 2025</a:t>
             </a:fld>
             <a:endParaRPr lang="en-US"/>
           </a:p>
@@ -16076,7 +16078,7 @@
           <a:p>
             <a:fld id="{CB5151AB-126F-4C4D-9C0D-9B9B07DC1CFA}" type="datetime2">
               <a:rPr lang="en-US" smtClean="0"/>
-              <a:t>Sunday, December 7, 2025</a:t>
+              <a:t>Tuesday, December 9, 2025</a:t>
             </a:fld>
             <a:endParaRPr lang="en-US"/>
           </a:p>
@@ -16472,7 +16474,7 @@
           <a:p>
             <a:fld id="{C8EB0D61-5867-4B60-96C2-F34431D24F0C}" type="datetime2">
               <a:rPr lang="en-US" smtClean="0"/>
-              <a:t>Sunday, December 7, 2025</a:t>
+              <a:t>Tuesday, December 9, 2025</a:t>
             </a:fld>
             <a:endParaRPr lang="en-US"/>
           </a:p>
@@ -17138,7 +17140,7 @@
           <a:p>
             <a:fld id="{774365B4-2BDD-42A8-8AD0-4FD66D3F5C4E}" type="datetime2">
               <a:rPr lang="en-US" smtClean="0"/>
-              <a:t>Sunday, December 7, 2025</a:t>
+              <a:t>Tuesday, December 9, 2025</a:t>
             </a:fld>
             <a:endParaRPr lang="en-US"/>
           </a:p>
@@ -17808,7 +17810,7 @@
           <a:p>
             <a:fld id="{18042AE0-E8A0-4C07-BDCE-3F5EAB477031}" type="datetime2">
               <a:rPr lang="en-US" smtClean="0"/>
-              <a:t>Sunday, December 7, 2025</a:t>
+              <a:t>Tuesday, December 9, 2025</a:t>
             </a:fld>
             <a:endParaRPr lang="en-US"/>
           </a:p>
@@ -18037,7 +18039,7 @@
           <a:p>
             <a:fld id="{118D1234-C791-4FA0-B7BF-3B97E1AFD349}" type="datetime2">
               <a:rPr lang="en-US" smtClean="0"/>
-              <a:t>Sunday, December 7, 2025</a:t>
+              <a:t>Tuesday, December 9, 2025</a:t>
             </a:fld>
             <a:endParaRPr lang="en-US"/>
           </a:p>
@@ -18670,7 +18672,7 @@
           <a:p>
             <a:fld id="{D599FD6B-A98A-41CE-AE80-E9BFC922155F}" type="datetime2">
               <a:rPr lang="en-US" smtClean="0"/>
-              <a:t>Sunday, December 7, 2025</a:t>
+              <a:t>Tuesday, December 9, 2025</a:t>
             </a:fld>
             <a:endParaRPr lang="en-US"/>
           </a:p>
@@ -18938,7 +18940,7 @@
           <a:p>
             <a:fld id="{E952A27B-DA16-4786-8944-4B1CF34905EE}" type="datetime2">
               <a:rPr lang="en-US" smtClean="0"/>
-              <a:t>Sunday, December 7, 2025</a:t>
+              <a:t>Tuesday, December 9, 2025</a:t>
             </a:fld>
             <a:endParaRPr lang="en-US"/>
           </a:p>
@@ -19768,7 +19770,7 @@
           <a:p>
             <a:fld id="{9C5DA190-1DE0-42AE-81F7-BAE9BB470D89}" type="datetime2">
               <a:rPr lang="en-US" smtClean="0"/>
-              <a:t>Sunday, December 7, 2025</a:t>
+              <a:t>Tuesday, December 9, 2025</a:t>
             </a:fld>
             <a:endParaRPr lang="en-US"/>
           </a:p>
@@ -20252,7 +20254,7 @@
           <a:p>
             <a:fld id="{2100A192-F923-4AB4-BDCC-6ACB26A0AAAE}" type="datetime2">
               <a:rPr lang="en-US" smtClean="0"/>
-              <a:t>Sunday, December 7, 2025</a:t>
+              <a:t>Tuesday, December 9, 2025</a:t>
             </a:fld>
             <a:endParaRPr lang="en-US"/>
           </a:p>
@@ -20832,7 +20834,7 @@
           <a:p>
             <a:fld id="{5531B838-A2A1-4E5F-8CE5-ED5C785421C8}" type="datetime2">
               <a:rPr lang="en-US" smtClean="0"/>
-              <a:t>Sunday, December 7, 2025</a:t>
+              <a:t>Tuesday, December 9, 2025</a:t>
             </a:fld>
             <a:endParaRPr lang="en-US"/>
           </a:p>
@@ -21482,7 +21484,7 @@
           <a:p>
             <a:fld id="{F3769460-8E62-40CA-83A8-CB830C3D7F18}" type="datetime2">
               <a:rPr lang="en-US" smtClean="0"/>
-              <a:t>Sunday, December 7, 2025</a:t>
+              <a:t>Tuesday, December 9, 2025</a:t>
             </a:fld>
             <a:endParaRPr lang="en-US"/>
           </a:p>
@@ -21965,7 +21967,7 @@
           <a:p>
             <a:fld id="{4D9BF413-3F81-4C14-A195-E47B863670C3}" type="datetime2">
               <a:rPr lang="en-US" smtClean="0"/>
-              <a:t>Sunday, December 7, 2025</a:t>
+              <a:t>Tuesday, December 9, 2025</a:t>
             </a:fld>
             <a:endParaRPr lang="en-US"/>
           </a:p>
@@ -22247,7 +22249,7 @@
           <a:p>
             <a:fld id="{53F1486C-F518-4593-A9F9-71F14C909BBB}" type="datetime2">
               <a:rPr lang="en-US" smtClean="0"/>
-              <a:t>Sunday, December 7, 2025</a:t>
+              <a:t>Tuesday, December 9, 2025</a:t>
             </a:fld>
             <a:endParaRPr lang="en-US"/>
           </a:p>
@@ -22672,7 +22674,7 @@
           <a:p>
             <a:fld id="{E54DDA2C-4D95-4DB6-BF4A-4F688D05F62F}" type="datetime2">
               <a:rPr lang="en-US" smtClean="0"/>
-              <a:t>Sunday, December 7, 2025</a:t>
+              <a:t>Tuesday, December 9, 2025</a:t>
             </a:fld>
             <a:endParaRPr lang="en-US"/>
           </a:p>
@@ -22821,7 +22823,7 @@
           <a:p>
             <a:fld id="{82AE4565-505C-457E-BFE9-7CA5ED3C51C4}" type="datetime2">
               <a:rPr lang="en-US" smtClean="0"/>
-              <a:t>Sunday, December 7, 2025</a:t>
+              <a:t>Tuesday, December 9, 2025</a:t>
             </a:fld>
             <a:endParaRPr lang="en-US"/>
           </a:p>
@@ -22937,7 +22939,7 @@
           <a:p>
             <a:fld id="{E882EFDC-6A75-4D73-91E7-2ECC26E96D93}" type="datetime2">
               <a:rPr lang="en-US" smtClean="0"/>
-              <a:t>Sunday, December 7, 2025</a:t>
+              <a:t>Tuesday, December 9, 2025</a:t>
             </a:fld>
             <a:endParaRPr lang="en-US"/>
           </a:p>
@@ -23245,7 +23247,7 @@
           <a:p>
             <a:fld id="{4B8D072B-0F30-4743-AD00-90BD7F92FC91}" type="datetime2">
               <a:rPr lang="en-US" smtClean="0"/>
-              <a:t>Sunday, December 7, 2025</a:t>
+              <a:t>Tuesday, December 9, 2025</a:t>
             </a:fld>
             <a:endParaRPr lang="en-US"/>
           </a:p>
@@ -23518,7 +23520,7 @@
           <a:p>
             <a:fld id="{EF8FF1A8-4BF9-4B7D-9A44-0F91B76D49BD}" type="datetime2">
               <a:rPr lang="en-US" smtClean="0"/>
-              <a:t>Sunday, December 7, 2025</a:t>
+              <a:t>Tuesday, December 9, 2025</a:t>
             </a:fld>
             <a:endParaRPr lang="en-US"/>
           </a:p>
@@ -24111,7 +24113,7 @@
           <a:p>
             <a:fld id="{CF7636FB-A6BA-4E3C-9023-5FBFE4689724}" type="datetime2">
               <a:rPr lang="en-US" smtClean="0"/>
-              <a:t>Sunday, December 7, 2025</a:t>
+              <a:t>Tuesday, December 9, 2025</a:t>
             </a:fld>
             <a:endParaRPr lang="en-US"/>
           </a:p>
@@ -24718,7 +24720,7 @@
           <a:p>
             <a:fld id="{0BFE3FE3-B74C-4213-AB2F-60F99F3419C3}" type="datetime2">
               <a:rPr lang="en-US" smtClean="0"/>
-              <a:t>Sunday, December 7, 2025</a:t>
+              <a:t>Tuesday, December 9, 2025</a:t>
             </a:fld>
             <a:endParaRPr lang="en-US"/>
           </a:p>
@@ -25358,7 +25360,7 @@
           <a:p>
             <a:fld id="{B369E90C-83BE-474F-8867-84D9D4BA9A64}" type="datetime2">
               <a:rPr lang="en-US" smtClean="0"/>
-              <a:t>Sunday, December 7, 2025</a:t>
+              <a:t>Tuesday, December 9, 2025</a:t>
             </a:fld>
             <a:endParaRPr lang="en-US"/>
           </a:p>
@@ -26033,7 +26035,7 @@
           <a:p>
             <a:fld id="{C7B5CA67-94ED-4C14-9B73-CCE5A85B4E93}" type="datetime2">
               <a:rPr lang="en-US" smtClean="0"/>
-              <a:t>Sunday, December 7, 2025</a:t>
+              <a:t>Tuesday, December 9, 2025</a:t>
             </a:fld>
             <a:endParaRPr lang="en-US"/>
           </a:p>
@@ -26610,7 +26612,7 @@
           <a:p>
             <a:fld id="{7723C116-3055-4F7F-9A49-EB260F9EF6F6}" type="datetime2">
               <a:rPr lang="en-US" smtClean="0"/>
-              <a:t>Sunday, December 7, 2025</a:t>
+              <a:t>Tuesday, December 9, 2025</a:t>
             </a:fld>
             <a:endParaRPr lang="en-US"/>
           </a:p>
@@ -27199,7 +27201,7 @@
           <a:p>
             <a:fld id="{A6A5EF91-D53E-428D-B2CB-7C1F753E44DB}" type="datetime2">
               <a:rPr lang="en-US" smtClean="0"/>
-              <a:t>Sunday, December 7, 2025</a:t>
+              <a:t>Tuesday, December 9, 2025</a:t>
             </a:fld>
             <a:endParaRPr lang="en-US"/>
           </a:p>
@@ -27821,7 +27823,7 @@
           <a:p>
             <a:fld id="{B4EA7F42-44CA-4E2D-BE54-54E50F1A95AA}" type="datetime2">
               <a:rPr lang="en-US" smtClean="0"/>
-              <a:t>Sunday, December 7, 2025</a:t>
+              <a:t>Tuesday, December 9, 2025</a:t>
             </a:fld>
             <a:endParaRPr lang="en-US"/>
           </a:p>
@@ -28221,7 +28223,7 @@
           <a:p>
             <a:fld id="{39174FB3-ACF6-4A9B-9D1F-91EEB8A6966E}" type="datetime2">
               <a:rPr lang="en-US" smtClean="0"/>
-              <a:t>Sunday, December 7, 2025</a:t>
+              <a:t>Tuesday, December 9, 2025</a:t>
             </a:fld>
             <a:endParaRPr lang="en-US"/>
           </a:p>
@@ -40935,368 +40937,6 @@
           <p:cNvPr id="2" name="Title 1">
             <a:extLst>
               <a:ext uri="{FF2B5EF4-FFF2-40B4-BE49-F238E27FC236}">
-                <a16:creationId xmlns:a16="http://schemas.microsoft.com/office/drawing/2014/main" id="{0FFD4276-9920-9AA8-ED08-E2709C67EAA7}"/>
-              </a:ext>
-            </a:extLst>
-          </p:cNvPr>
-          <p:cNvSpPr>
-            <a:spLocks noGrp="1"/>
-          </p:cNvSpPr>
-          <p:nvPr>
-            <p:ph type="title"/>
-          </p:nvPr>
-        </p:nvSpPr>
-        <p:spPr/>
-        <p:txBody>
-          <a:bodyPr/>
-          <a:lstStyle/>
-          <a:p>
-            <a:r>
-              <a:rPr lang="en-IN" dirty="0"/>
-              <a:t>Real-Time Fraud Monitoring System </a:t>
-            </a:r>
-            <a:r>
-              <a:rPr lang="en-IN" b="0" dirty="0"/>
-              <a:t>	</a:t>
-            </a:r>
-            <a:br>
-              <a:rPr lang="en-IN" b="0" dirty="0"/>
-            </a:br>
-            <a:endParaRPr lang="en-IN" dirty="0"/>
-          </a:p>
-        </p:txBody>
-      </p:sp>
-      <p:pic>
-        <p:nvPicPr>
-          <p:cNvPr id="6" name="Content Placeholder 5" descr="A screenshot of a computer">
-            <a:extLst>
-              <a:ext uri="{FF2B5EF4-FFF2-40B4-BE49-F238E27FC236}">
-                <a16:creationId xmlns:a16="http://schemas.microsoft.com/office/drawing/2014/main" id="{CA960C1B-B090-3DFC-74A5-0D889A456C17}"/>
-              </a:ext>
-            </a:extLst>
-          </p:cNvPr>
-          <p:cNvPicPr>
-            <a:picLocks noGrp="1" noChangeAspect="1"/>
-          </p:cNvPicPr>
-          <p:nvPr>
-            <p:ph sz="quarter" idx="14"/>
-          </p:nvPr>
-        </p:nvPicPr>
-        <p:blipFill>
-          <a:blip r:embed="rId2"/>
-          <a:stretch>
-            <a:fillRect/>
-          </a:stretch>
-        </p:blipFill>
-        <p:spPr>
-          <a:xfrm>
-            <a:off x="731521" y="904875"/>
-            <a:ext cx="10644402" cy="5309112"/>
-          </a:xfrm>
-          <a:prstGeom prst="rect">
-            <a:avLst/>
-          </a:prstGeom>
-        </p:spPr>
-      </p:pic>
-    </p:spTree>
-    <p:extLst>
-      <p:ext uri="{BB962C8B-B14F-4D97-AF65-F5344CB8AC3E}">
-        <p14:creationId xmlns:p14="http://schemas.microsoft.com/office/powerpoint/2010/main" val="2582047708"/>
-      </p:ext>
-    </p:extLst>
-  </p:cSld>
-  <p:clrMapOvr>
-    <a:masterClrMapping/>
-  </p:clrMapOvr>
-</p:sld>
-</file>
-
-<file path=ppt/slides/slide24.xml><?xml version="1.0" encoding="utf-8"?>
-<p:sld xmlns:a="http://schemas.openxmlformats.org/drawingml/2006/main" xmlns:r="http://schemas.openxmlformats.org/officeDocument/2006/relationships" xmlns:p="http://schemas.openxmlformats.org/presentationml/2006/main">
-  <p:cSld>
-    <p:spTree>
-      <p:nvGrpSpPr>
-        <p:cNvPr id="1" name=""/>
-        <p:cNvGrpSpPr/>
-        <p:nvPr/>
-      </p:nvGrpSpPr>
-      <p:grpSpPr>
-        <a:xfrm>
-          <a:off x="0" y="0"/>
-          <a:ext cx="0" cy="0"/>
-          <a:chOff x="0" y="0"/>
-          <a:chExt cx="0" cy="0"/>
-        </a:xfrm>
-      </p:grpSpPr>
-      <p:pic>
-        <p:nvPicPr>
-          <p:cNvPr id="6" name="Content Placeholder 5" descr="A screenshot of a computer">
-            <a:extLst>
-              <a:ext uri="{FF2B5EF4-FFF2-40B4-BE49-F238E27FC236}">
-                <a16:creationId xmlns:a16="http://schemas.microsoft.com/office/drawing/2014/main" id="{6DE88107-54F8-653F-44BC-A111854EBDED}"/>
-              </a:ext>
-            </a:extLst>
-          </p:cNvPr>
-          <p:cNvPicPr>
-            <a:picLocks noGrp="1" noChangeAspect="1"/>
-          </p:cNvPicPr>
-          <p:nvPr>
-            <p:ph sz="quarter" idx="14"/>
-          </p:nvPr>
-        </p:nvPicPr>
-        <p:blipFill>
-          <a:blip r:embed="rId2"/>
-          <a:stretch>
-            <a:fillRect/>
-          </a:stretch>
-        </p:blipFill>
-        <p:spPr>
-          <a:xfrm>
-            <a:off x="731838" y="825910"/>
-            <a:ext cx="10693400" cy="4031225"/>
-          </a:xfrm>
-          <a:prstGeom prst="rect">
-            <a:avLst/>
-          </a:prstGeom>
-        </p:spPr>
-      </p:pic>
-      <mc:AlternateContent xmlns:mc="http://schemas.openxmlformats.org/markup-compatibility/2006" xmlns:a14="http://schemas.microsoft.com/office/drawing/2010/main">
-        <mc:Choice Requires="a14">
-          <p:sp>
-            <p:nvSpPr>
-              <p:cNvPr id="8" name="TextBox 7">
-                <a:extLst>
-                  <a:ext uri="{FF2B5EF4-FFF2-40B4-BE49-F238E27FC236}">
-                    <a16:creationId xmlns:a16="http://schemas.microsoft.com/office/drawing/2014/main" id="{0BC5E8AA-5F62-93A5-FEB1-4D9B5263CBF0}"/>
-                  </a:ext>
-                </a:extLst>
-              </p:cNvPr>
-              <p:cNvSpPr txBox="1"/>
-              <p:nvPr/>
-            </p:nvSpPr>
-            <p:spPr>
-              <a:xfrm>
-                <a:off x="835741" y="5102942"/>
-                <a:ext cx="10844981" cy="1268681"/>
-              </a:xfrm>
-              <a:prstGeom prst="rect">
-                <a:avLst/>
-              </a:prstGeom>
-              <a:noFill/>
-            </p:spPr>
-            <p:txBody>
-              <a:bodyPr wrap="square" rtlCol="0">
-                <a:spAutoFit/>
-              </a:bodyPr>
-              <a:lstStyle/>
-              <a:p>
-                <a:r>
-                  <a:rPr lang="en-IN" b="1" dirty="0"/>
-                  <a:t>To calculate the percentage of predicted fraud transactions:</a:t>
-                </a:r>
-              </a:p>
-              <a:p>
-                <a:pPr/>
-                <a14:m>
-                  <m:oMathPara xmlns:m="http://schemas.openxmlformats.org/officeDocument/2006/math">
-                    <m:oMathParaPr>
-                      <m:jc m:val="centerGroup"/>
-                    </m:oMathParaPr>
-                    <m:oMath xmlns:m="http://schemas.openxmlformats.org/officeDocument/2006/math">
-                      <m:r>
-                        <m:rPr>
-                          <m:nor/>
-                        </m:rPr>
-                        <a:rPr lang="en-IN" b="0"/>
-                        <m:t>Percentage</m:t>
-                      </m:r>
-                      <m:r>
-                        <a:rPr lang="en-IN">
-                          <a:latin typeface="Cambria Math" panose="02040503050406030204" pitchFamily="18" charset="0"/>
-                        </a:rPr>
-                        <m:t>=</m:t>
-                      </m:r>
-                      <m:d>
-                        <m:dPr>
-                          <m:ctrlPr>
-                            <a:rPr lang="ar-AE" i="1">
-                              <a:latin typeface="Cambria Math" panose="02040503050406030204" pitchFamily="18" charset="0"/>
-                            </a:rPr>
-                          </m:ctrlPr>
-                        </m:dPr>
-                        <m:e>
-                          <m:f>
-                            <m:fPr>
-                              <m:ctrlPr>
-                                <a:rPr lang="ar-AE" i="1">
-                                  <a:latin typeface="Cambria Math" panose="02040503050406030204" pitchFamily="18" charset="0"/>
-                                </a:rPr>
-                              </m:ctrlPr>
-                            </m:fPr>
-                            <m:num>
-                              <m:r>
-                                <a:rPr lang="ar-AE">
-                                  <a:latin typeface="Cambria Math" panose="02040503050406030204" pitchFamily="18" charset="0"/>
-                                </a:rPr>
-                                <m:t>1410</m:t>
-                              </m:r>
-                            </m:num>
-                            <m:den>
-                              <m:r>
-                                <a:rPr lang="ar-AE">
-                                  <a:latin typeface="Cambria Math" panose="02040503050406030204" pitchFamily="18" charset="0"/>
-                                </a:rPr>
-                                <m:t>1048575</m:t>
-                              </m:r>
-                            </m:den>
-                          </m:f>
-                        </m:e>
-                      </m:d>
-                      <m:r>
-                        <a:rPr lang="ar-AE">
-                          <a:latin typeface="Cambria Math" panose="02040503050406030204" pitchFamily="18" charset="0"/>
-                        </a:rPr>
-                        <m:t>×</m:t>
-                      </m:r>
-                      <m:r>
-                        <a:rPr lang="ar-AE">
-                          <a:latin typeface="Cambria Math" panose="02040503050406030204" pitchFamily="18" charset="0"/>
-                        </a:rPr>
-                        <m:t>100</m:t>
-                      </m:r>
-                      <m:r>
-                        <a:rPr lang="ar-AE">
-                          <a:latin typeface="Cambria Math" panose="02040503050406030204" pitchFamily="18" charset="0"/>
-                        </a:rPr>
-                        <m:t>≈</m:t>
-                      </m:r>
-                      <m:r>
-                        <a:rPr lang="ar-AE" b="1" i="1" smtClean="0">
-                          <a:solidFill>
-                            <a:srgbClr val="FF0000"/>
-                          </a:solidFill>
-                          <a:latin typeface="Cambria Math" panose="02040503050406030204" pitchFamily="18" charset="0"/>
-                        </a:rPr>
-                        <m:t>𝟎</m:t>
-                      </m:r>
-                      <m:r>
-                        <a:rPr lang="ar-AE" b="1">
-                          <a:solidFill>
-                            <a:srgbClr val="FF0000"/>
-                          </a:solidFill>
-                          <a:latin typeface="Cambria Math" panose="02040503050406030204" pitchFamily="18" charset="0"/>
-                        </a:rPr>
-                        <m:t>.</m:t>
-                      </m:r>
-                      <m:r>
-                        <a:rPr lang="ar-AE" b="1" i="1">
-                          <a:solidFill>
-                            <a:srgbClr val="FF0000"/>
-                          </a:solidFill>
-                          <a:latin typeface="Cambria Math" panose="02040503050406030204" pitchFamily="18" charset="0"/>
-                        </a:rPr>
-                        <m:t>𝟏𝟑𝟒𝟒</m:t>
-                      </m:r>
-                      <m:r>
-                        <a:rPr lang="ar-AE" b="1">
-                          <a:solidFill>
-                            <a:srgbClr val="FF0000"/>
-                          </a:solidFill>
-                          <a:latin typeface="Cambria Math" panose="02040503050406030204" pitchFamily="18" charset="0"/>
-                        </a:rPr>
-                        <m:t>%</m:t>
-                      </m:r>
-                    </m:oMath>
-                  </m:oMathPara>
-                </a14:m>
-                <a:endParaRPr lang="ar-AE" b="1" dirty="0"/>
-              </a:p>
-              <a:p>
-                <a:endParaRPr lang="en-IN" dirty="0"/>
-              </a:p>
-            </p:txBody>
-          </p:sp>
-        </mc:Choice>
-        <mc:Fallback xmlns="">
-          <p:sp>
-            <p:nvSpPr>
-              <p:cNvPr id="8" name="TextBox 7">
-                <a:extLst>
-                  <a:ext uri="{FF2B5EF4-FFF2-40B4-BE49-F238E27FC236}">
-                    <a16:creationId xmlns:a16="http://schemas.microsoft.com/office/drawing/2014/main" id="{0BC5E8AA-5F62-93A5-FEB1-4D9B5263CBF0}"/>
-                  </a:ext>
-                </a:extLst>
-              </p:cNvPr>
-              <p:cNvSpPr txBox="1">
-                <a:spLocks noRot="1" noChangeAspect="1" noMove="1" noResize="1" noEditPoints="1" noAdjustHandles="1" noChangeArrowheads="1" noChangeShapeType="1" noTextEdit="1"/>
-              </p:cNvSpPr>
-              <p:nvPr/>
-            </p:nvSpPr>
-            <p:spPr>
-              <a:xfrm>
-                <a:off x="835741" y="5102942"/>
-                <a:ext cx="10844981" cy="1268681"/>
-              </a:xfrm>
-              <a:prstGeom prst="rect">
-                <a:avLst/>
-              </a:prstGeom>
-              <a:blipFill>
-                <a:blip r:embed="rId3"/>
-                <a:stretch>
-                  <a:fillRect l="-450" t="-1923"/>
-                </a:stretch>
-              </a:blipFill>
-            </p:spPr>
-            <p:txBody>
-              <a:bodyPr/>
-              <a:lstStyle/>
-              <a:p>
-                <a:r>
-                  <a:rPr lang="en-IN">
-                    <a:noFill/>
-                  </a:rPr>
-                  <a:t> </a:t>
-                </a:r>
-              </a:p>
-            </p:txBody>
-          </p:sp>
-        </mc:Fallback>
-      </mc:AlternateContent>
-    </p:spTree>
-    <p:extLst>
-      <p:ext uri="{BB962C8B-B14F-4D97-AF65-F5344CB8AC3E}">
-        <p14:creationId xmlns:p14="http://schemas.microsoft.com/office/powerpoint/2010/main" val="792552890"/>
-      </p:ext>
-    </p:extLst>
-  </p:cSld>
-  <p:clrMapOvr>
-    <a:masterClrMapping/>
-  </p:clrMapOvr>
-</p:sld>
-</file>
-
-<file path=ppt/slides/slide25.xml><?xml version="1.0" encoding="utf-8"?>
-<p:sld xmlns:a="http://schemas.openxmlformats.org/drawingml/2006/main" xmlns:r="http://schemas.openxmlformats.org/officeDocument/2006/relationships" xmlns:p="http://schemas.openxmlformats.org/presentationml/2006/main">
-  <p:cSld>
-    <p:spTree>
-      <p:nvGrpSpPr>
-        <p:cNvPr id="1" name=""/>
-        <p:cNvGrpSpPr/>
-        <p:nvPr/>
-      </p:nvGrpSpPr>
-      <p:grpSpPr>
-        <a:xfrm>
-          <a:off x="0" y="0"/>
-          <a:ext cx="0" cy="0"/>
-          <a:chOff x="0" y="0"/>
-          <a:chExt cx="0" cy="0"/>
-        </a:xfrm>
-      </p:grpSpPr>
-      <p:sp>
-        <p:nvSpPr>
-          <p:cNvPr id="2" name="Title 1">
-            <a:extLst>
-              <a:ext uri="{FF2B5EF4-FFF2-40B4-BE49-F238E27FC236}">
                 <a16:creationId xmlns:a16="http://schemas.microsoft.com/office/drawing/2014/main" id="{5DDAE4ED-81E4-FA1A-2677-9C856A95DBB6}"/>
               </a:ext>
             </a:extLst>
@@ -41435,7 +41075,677 @@
 </p:sld>
 </file>
 
+<file path=ppt/slides/slide24.xml><?xml version="1.0" encoding="utf-8"?>
+<p:sld xmlns:a="http://schemas.openxmlformats.org/drawingml/2006/main" xmlns:r="http://schemas.openxmlformats.org/officeDocument/2006/relationships" xmlns:p="http://schemas.openxmlformats.org/presentationml/2006/main">
+  <p:cSld>
+    <p:spTree>
+      <p:nvGrpSpPr>
+        <p:cNvPr id="1" name=""/>
+        <p:cNvGrpSpPr/>
+        <p:nvPr/>
+      </p:nvGrpSpPr>
+      <p:grpSpPr>
+        <a:xfrm>
+          <a:off x="0" y="0"/>
+          <a:ext cx="0" cy="0"/>
+          <a:chOff x="0" y="0"/>
+          <a:chExt cx="0" cy="0"/>
+        </a:xfrm>
+      </p:grpSpPr>
+      <p:sp>
+        <p:nvSpPr>
+          <p:cNvPr id="3" name="Title 2">
+            <a:extLst>
+              <a:ext uri="{FF2B5EF4-FFF2-40B4-BE49-F238E27FC236}">
+                <a16:creationId xmlns:a16="http://schemas.microsoft.com/office/drawing/2014/main" id="{A99BF845-19A2-BDB4-36CF-6EAF3A522A2F}"/>
+              </a:ext>
+            </a:extLst>
+          </p:cNvPr>
+          <p:cNvSpPr>
+            <a:spLocks noGrp="1"/>
+          </p:cNvSpPr>
+          <p:nvPr>
+            <p:ph type="title"/>
+          </p:nvPr>
+        </p:nvSpPr>
+        <p:spPr/>
+        <p:txBody>
+          <a:bodyPr/>
+          <a:lstStyle/>
+          <a:p>
+            <a:r>
+              <a:rPr lang="en-US" dirty="0"/>
+              <a:t>Deployment Method using </a:t>
+            </a:r>
+            <a:r>
+              <a:rPr lang="en-US" dirty="0" err="1"/>
+              <a:t>streamlit</a:t>
+            </a:r>
+            <a:endParaRPr lang="en-US" dirty="0"/>
+          </a:p>
+        </p:txBody>
+      </p:sp>
+      <p:sp>
+        <p:nvSpPr>
+          <p:cNvPr id="4" name="Content Placeholder 3">
+            <a:extLst>
+              <a:ext uri="{FF2B5EF4-FFF2-40B4-BE49-F238E27FC236}">
+                <a16:creationId xmlns:a16="http://schemas.microsoft.com/office/drawing/2014/main" id="{5A38C7CC-7B40-1F95-E138-91C64D2A2B30}"/>
+              </a:ext>
+            </a:extLst>
+          </p:cNvPr>
+          <p:cNvSpPr>
+            <a:spLocks noGrp="1"/>
+          </p:cNvSpPr>
+          <p:nvPr>
+            <p:ph idx="1"/>
+          </p:nvPr>
+        </p:nvSpPr>
+        <p:spPr/>
+        <p:txBody>
+          <a:bodyPr/>
+          <a:lstStyle/>
+          <a:p>
+            <a:r>
+              <a:rPr lang="en-US" dirty="0"/>
+              <a:t>To Achieve real time processing we’ve taken the </a:t>
+            </a:r>
+            <a:r>
+              <a:rPr lang="en-US" dirty="0" err="1"/>
+              <a:t>pkl</a:t>
+            </a:r>
+            <a:r>
+              <a:rPr lang="en-US" dirty="0"/>
+              <a:t> file saved from each model executed.</a:t>
+            </a:r>
+          </a:p>
+          <a:p>
+            <a:r>
+              <a:rPr lang="en-US" dirty="0"/>
+              <a:t>These </a:t>
+            </a:r>
+            <a:r>
+              <a:rPr lang="en-US" dirty="0" err="1"/>
+              <a:t>pkl</a:t>
+            </a:r>
+            <a:r>
+              <a:rPr lang="en-US" dirty="0"/>
+              <a:t> files are used to run on a sample of data of 1000 records.</a:t>
+            </a:r>
+          </a:p>
+          <a:p>
+            <a:r>
+              <a:rPr lang="en-US" dirty="0"/>
+              <a:t>For first time users need to install pip install pandas </a:t>
+            </a:r>
+            <a:r>
+              <a:rPr lang="en-US" dirty="0" err="1"/>
+              <a:t>numpy</a:t>
+            </a:r>
+            <a:r>
+              <a:rPr lang="en-US" dirty="0"/>
+              <a:t> </a:t>
+            </a:r>
+            <a:r>
+              <a:rPr lang="en-US" dirty="0" err="1"/>
+              <a:t>streamlit</a:t>
+            </a:r>
+            <a:r>
+              <a:rPr lang="en-US" dirty="0"/>
+              <a:t> </a:t>
+            </a:r>
+            <a:r>
+              <a:rPr lang="en-US" dirty="0" err="1"/>
+              <a:t>catboost</a:t>
+            </a:r>
+            <a:r>
+              <a:rPr lang="en-US" dirty="0"/>
+              <a:t>.</a:t>
+            </a:r>
+          </a:p>
+          <a:p>
+            <a:r>
+              <a:rPr lang="en-US" dirty="0"/>
+              <a:t>Then create a .bat file with below code:</a:t>
+            </a:r>
+          </a:p>
+          <a:p>
+            <a:pPr marL="0" indent="0">
+              <a:buNone/>
+            </a:pPr>
+            <a:r>
+              <a:rPr lang="en-US" dirty="0"/>
+              <a:t>@echo off</a:t>
+            </a:r>
+          </a:p>
+          <a:p>
+            <a:pPr marL="0" indent="0">
+              <a:buNone/>
+            </a:pPr>
+            <a:r>
+              <a:rPr lang="en-US" dirty="0"/>
+              <a:t>cd &lt;Your Deployment Windows Folder path &gt;</a:t>
+            </a:r>
+          </a:p>
+          <a:p>
+            <a:pPr marL="0" indent="0">
+              <a:buNone/>
+            </a:pPr>
+            <a:r>
+              <a:rPr lang="en-US" dirty="0"/>
+              <a:t>python -m </a:t>
+            </a:r>
+            <a:r>
+              <a:rPr lang="en-US" dirty="0" err="1"/>
+              <a:t>streamlit</a:t>
+            </a:r>
+            <a:r>
+              <a:rPr lang="en-US" dirty="0"/>
+              <a:t> run app.py</a:t>
+            </a:r>
+          </a:p>
+          <a:p>
+            <a:pPr marL="0" indent="0">
+              <a:buNone/>
+            </a:pPr>
+            <a:r>
+              <a:rPr lang="en-US" dirty="0"/>
+              <a:t>Then Run the .bat file to launch web browser. It’ll open local host : localhost:8501</a:t>
+            </a:r>
+          </a:p>
+        </p:txBody>
+      </p:sp>
+    </p:spTree>
+    <p:extLst>
+      <p:ext uri="{BB962C8B-B14F-4D97-AF65-F5344CB8AC3E}">
+        <p14:creationId xmlns:p14="http://schemas.microsoft.com/office/powerpoint/2010/main" val="103099576"/>
+      </p:ext>
+    </p:extLst>
+  </p:cSld>
+  <p:clrMapOvr>
+    <a:masterClrMapping/>
+  </p:clrMapOvr>
+</p:sld>
+</file>
+
+<file path=ppt/slides/slide25.xml><?xml version="1.0" encoding="utf-8"?>
+<p:sld xmlns:a="http://schemas.openxmlformats.org/drawingml/2006/main" xmlns:r="http://schemas.openxmlformats.org/officeDocument/2006/relationships" xmlns:p="http://schemas.openxmlformats.org/presentationml/2006/main">
+  <p:cSld>
+    <p:spTree>
+      <p:nvGrpSpPr>
+        <p:cNvPr id="1" name=""/>
+        <p:cNvGrpSpPr/>
+        <p:nvPr/>
+      </p:nvGrpSpPr>
+      <p:grpSpPr>
+        <a:xfrm>
+          <a:off x="0" y="0"/>
+          <a:ext cx="0" cy="0"/>
+          <a:chOff x="0" y="0"/>
+          <a:chExt cx="0" cy="0"/>
+        </a:xfrm>
+      </p:grpSpPr>
+      <p:sp>
+        <p:nvSpPr>
+          <p:cNvPr id="2" name="Title 1">
+            <a:extLst>
+              <a:ext uri="{FF2B5EF4-FFF2-40B4-BE49-F238E27FC236}">
+                <a16:creationId xmlns:a16="http://schemas.microsoft.com/office/drawing/2014/main" id="{0FFD4276-9920-9AA8-ED08-E2709C67EAA7}"/>
+              </a:ext>
+            </a:extLst>
+          </p:cNvPr>
+          <p:cNvSpPr>
+            <a:spLocks noGrp="1"/>
+          </p:cNvSpPr>
+          <p:nvPr>
+            <p:ph type="title"/>
+          </p:nvPr>
+        </p:nvSpPr>
+        <p:spPr/>
+        <p:txBody>
+          <a:bodyPr/>
+          <a:lstStyle/>
+          <a:p>
+            <a:r>
+              <a:rPr lang="en-IN" dirty="0"/>
+              <a:t>Real-Time Fraud Monitoring System </a:t>
+            </a:r>
+            <a:r>
+              <a:rPr lang="en-IN" b="0" dirty="0"/>
+              <a:t>	</a:t>
+            </a:r>
+            <a:br>
+              <a:rPr lang="en-IN" b="0" dirty="0"/>
+            </a:br>
+            <a:endParaRPr lang="en-IN" dirty="0"/>
+          </a:p>
+        </p:txBody>
+      </p:sp>
+      <p:pic>
+        <p:nvPicPr>
+          <p:cNvPr id="7" name="Content Placeholder 6">
+            <a:extLst>
+              <a:ext uri="{FF2B5EF4-FFF2-40B4-BE49-F238E27FC236}">
+                <a16:creationId xmlns:a16="http://schemas.microsoft.com/office/drawing/2014/main" id="{453085BC-F752-1195-2390-37D941E8CE08}"/>
+              </a:ext>
+            </a:extLst>
+          </p:cNvPr>
+          <p:cNvPicPr>
+            <a:picLocks noGrp="1" noChangeAspect="1"/>
+          </p:cNvPicPr>
+          <p:nvPr>
+            <p:ph sz="quarter" idx="14"/>
+          </p:nvPr>
+        </p:nvPicPr>
+        <p:blipFill>
+          <a:blip r:embed="rId2"/>
+          <a:stretch>
+            <a:fillRect/>
+          </a:stretch>
+        </p:blipFill>
+        <p:spPr>
+          <a:xfrm>
+            <a:off x="731519" y="967773"/>
+            <a:ext cx="10870545" cy="4874904"/>
+          </a:xfrm>
+          <a:prstGeom prst="rect">
+            <a:avLst/>
+          </a:prstGeom>
+        </p:spPr>
+      </p:pic>
+      <p:sp>
+        <p:nvSpPr>
+          <p:cNvPr id="8" name="TextBox 7">
+            <a:extLst>
+              <a:ext uri="{FF2B5EF4-FFF2-40B4-BE49-F238E27FC236}">
+                <a16:creationId xmlns:a16="http://schemas.microsoft.com/office/drawing/2014/main" id="{BC04DDE1-6A79-70C4-E45B-6C303ADACB46}"/>
+              </a:ext>
+            </a:extLst>
+          </p:cNvPr>
+          <p:cNvSpPr txBox="1"/>
+          <p:nvPr/>
+        </p:nvSpPr>
+        <p:spPr>
+          <a:xfrm>
+            <a:off x="662692" y="5842677"/>
+            <a:ext cx="11460482" cy="646331"/>
+          </a:xfrm>
+          <a:prstGeom prst="rect">
+            <a:avLst/>
+          </a:prstGeom>
+          <a:noFill/>
+        </p:spPr>
+        <p:txBody>
+          <a:bodyPr wrap="square" rtlCol="0">
+            <a:spAutoFit/>
+          </a:bodyPr>
+          <a:lstStyle/>
+          <a:p>
+            <a:r>
+              <a:rPr lang="en-US" b="1" dirty="0">
+                <a:highlight>
+                  <a:srgbClr val="FFFF00"/>
+                </a:highlight>
+              </a:rPr>
+              <a:t>Note: I’ve uses </a:t>
+            </a:r>
+            <a:r>
+              <a:rPr lang="en-US" b="1" dirty="0" err="1">
+                <a:highlight>
+                  <a:srgbClr val="FFFF00"/>
+                </a:highlight>
+              </a:rPr>
+              <a:t>numpy</a:t>
+            </a:r>
+            <a:r>
+              <a:rPr lang="en-US" b="1" dirty="0">
+                <a:highlight>
+                  <a:srgbClr val="FFFF00"/>
+                </a:highlight>
+              </a:rPr>
+              <a:t> to randomly generate 5000 number b/w 1 to 1000000 and use </a:t>
+            </a:r>
+            <a:r>
+              <a:rPr lang="en-US" b="1" dirty="0" err="1">
+                <a:highlight>
+                  <a:srgbClr val="FFFF00"/>
+                </a:highlight>
+              </a:rPr>
+              <a:t>df.loc</a:t>
+            </a:r>
+            <a:r>
+              <a:rPr lang="en-US" b="1" dirty="0">
+                <a:highlight>
+                  <a:srgbClr val="FFFF00"/>
+                </a:highlight>
+              </a:rPr>
+              <a:t>[</a:t>
+            </a:r>
+            <a:r>
+              <a:rPr lang="en-US" b="1" dirty="0" err="1">
+                <a:highlight>
+                  <a:srgbClr val="FFFF00"/>
+                </a:highlight>
+              </a:rPr>
+              <a:t>number_ranges</a:t>
+            </a:r>
+            <a:r>
+              <a:rPr lang="en-US" b="1" dirty="0">
+                <a:highlight>
+                  <a:srgbClr val="FFFF00"/>
+                </a:highlight>
+              </a:rPr>
+              <a:t>] to get random records, we can update the range from 100K to 200k and so on to generate multiple batches.</a:t>
+            </a:r>
+          </a:p>
+        </p:txBody>
+      </p:sp>
+    </p:spTree>
+    <p:extLst>
+      <p:ext uri="{BB962C8B-B14F-4D97-AF65-F5344CB8AC3E}">
+        <p14:creationId xmlns:p14="http://schemas.microsoft.com/office/powerpoint/2010/main" val="2582047708"/>
+      </p:ext>
+    </p:extLst>
+  </p:cSld>
+  <p:clrMapOvr>
+    <a:masterClrMapping/>
+  </p:clrMapOvr>
+</p:sld>
+</file>
+
 <file path=ppt/slides/slide26.xml><?xml version="1.0" encoding="utf-8"?>
+<p:sld xmlns:a="http://schemas.openxmlformats.org/drawingml/2006/main" xmlns:r="http://schemas.openxmlformats.org/officeDocument/2006/relationships" xmlns:p="http://schemas.openxmlformats.org/presentationml/2006/main">
+  <p:cSld>
+    <p:spTree>
+      <p:nvGrpSpPr>
+        <p:cNvPr id="1" name=""/>
+        <p:cNvGrpSpPr/>
+        <p:nvPr/>
+      </p:nvGrpSpPr>
+      <p:grpSpPr>
+        <a:xfrm>
+          <a:off x="0" y="0"/>
+          <a:ext cx="0" cy="0"/>
+          <a:chOff x="0" y="0"/>
+          <a:chExt cx="0" cy="0"/>
+        </a:xfrm>
+      </p:grpSpPr>
+      <mc:AlternateContent xmlns:mc="http://schemas.openxmlformats.org/markup-compatibility/2006">
+        <mc:Choice xmlns:a14="http://schemas.microsoft.com/office/drawing/2010/main" Requires="a14">
+          <p:sp>
+            <p:nvSpPr>
+              <p:cNvPr id="8" name="TextBox 7">
+                <a:extLst>
+                  <a:ext uri="{FF2B5EF4-FFF2-40B4-BE49-F238E27FC236}">
+                    <a16:creationId xmlns:a16="http://schemas.microsoft.com/office/drawing/2014/main" id="{0BC5E8AA-5F62-93A5-FEB1-4D9B5263CBF0}"/>
+                  </a:ext>
+                </a:extLst>
+              </p:cNvPr>
+              <p:cNvSpPr txBox="1"/>
+              <p:nvPr/>
+            </p:nvSpPr>
+            <p:spPr>
+              <a:xfrm>
+                <a:off x="835741" y="5102942"/>
+                <a:ext cx="10844981" cy="1268681"/>
+              </a:xfrm>
+              <a:prstGeom prst="rect">
+                <a:avLst/>
+              </a:prstGeom>
+              <a:noFill/>
+            </p:spPr>
+            <p:txBody>
+              <a:bodyPr wrap="square" rtlCol="0">
+                <a:spAutoFit/>
+              </a:bodyPr>
+              <a:lstStyle/>
+              <a:p>
+                <a:r>
+                  <a:rPr lang="en-IN" b="1" dirty="0"/>
+                  <a:t>To calculate the percentage of predicted fraud transactions:</a:t>
+                </a:r>
+              </a:p>
+              <a:p>
+                <a:pPr/>
+                <a14:m>
+                  <m:oMathPara xmlns:m="http://schemas.openxmlformats.org/officeDocument/2006/math">
+                    <m:oMathParaPr>
+                      <m:jc m:val="centerGroup"/>
+                    </m:oMathParaPr>
+                    <m:oMath xmlns:m="http://schemas.openxmlformats.org/officeDocument/2006/math">
+                      <m:r>
+                        <m:rPr>
+                          <m:nor/>
+                        </m:rPr>
+                        <a:rPr lang="en-IN" b="0"/>
+                        <m:t>Percentage</m:t>
+                      </m:r>
+                      <m:r>
+                        <a:rPr lang="en-IN">
+                          <a:latin typeface="Cambria Math" panose="02040503050406030204" pitchFamily="18" charset="0"/>
+                        </a:rPr>
+                        <m:t>=</m:t>
+                      </m:r>
+                      <m:d>
+                        <m:dPr>
+                          <m:ctrlPr>
+                            <a:rPr lang="ar-AE" i="1">
+                              <a:latin typeface="Cambria Math" panose="02040503050406030204" pitchFamily="18" charset="0"/>
+                            </a:rPr>
+                          </m:ctrlPr>
+                        </m:dPr>
+                        <m:e>
+                          <m:f>
+                            <m:fPr>
+                              <m:ctrlPr>
+                                <a:rPr lang="ar-AE" i="1">
+                                  <a:latin typeface="Cambria Math" panose="02040503050406030204" pitchFamily="18" charset="0"/>
+                                </a:rPr>
+                              </m:ctrlPr>
+                            </m:fPr>
+                            <m:num>
+                              <m:r>
+                                <a:rPr lang="en-US" b="0" i="0" smtClean="0">
+                                  <a:latin typeface="Cambria Math" panose="02040503050406030204" pitchFamily="18" charset="0"/>
+                                </a:rPr>
+                                <m:t>9</m:t>
+                              </m:r>
+                            </m:num>
+                            <m:den>
+                              <m:r>
+                                <a:rPr lang="en-US" b="0" i="0" smtClean="0">
+                                  <a:latin typeface="Cambria Math" panose="02040503050406030204" pitchFamily="18" charset="0"/>
+                                </a:rPr>
+                                <m:t>1000</m:t>
+                              </m:r>
+                            </m:den>
+                          </m:f>
+                        </m:e>
+                      </m:d>
+                      <m:r>
+                        <a:rPr lang="ar-AE">
+                          <a:latin typeface="Cambria Math" panose="02040503050406030204" pitchFamily="18" charset="0"/>
+                        </a:rPr>
+                        <m:t>×</m:t>
+                      </m:r>
+                      <m:r>
+                        <a:rPr lang="ar-AE">
+                          <a:latin typeface="Cambria Math" panose="02040503050406030204" pitchFamily="18" charset="0"/>
+                        </a:rPr>
+                        <m:t>100</m:t>
+                      </m:r>
+                      <m:r>
+                        <a:rPr lang="ar-AE">
+                          <a:latin typeface="Cambria Math" panose="02040503050406030204" pitchFamily="18" charset="0"/>
+                        </a:rPr>
+                        <m:t>≈</m:t>
+                      </m:r>
+                      <m:r>
+                        <a:rPr lang="ar-AE" b="1" i="1" smtClean="0">
+                          <a:solidFill>
+                            <a:srgbClr val="FF0000"/>
+                          </a:solidFill>
+                          <a:latin typeface="Cambria Math" panose="02040503050406030204" pitchFamily="18" charset="0"/>
+                        </a:rPr>
+                        <m:t>𝟎</m:t>
+                      </m:r>
+                      <m:r>
+                        <a:rPr lang="ar-AE" b="1">
+                          <a:solidFill>
+                            <a:srgbClr val="FF0000"/>
+                          </a:solidFill>
+                          <a:latin typeface="Cambria Math" panose="02040503050406030204" pitchFamily="18" charset="0"/>
+                        </a:rPr>
+                        <m:t>.</m:t>
+                      </m:r>
+                      <m:r>
+                        <a:rPr lang="en-US" b="1" i="0" smtClean="0">
+                          <a:solidFill>
+                            <a:srgbClr val="FF0000"/>
+                          </a:solidFill>
+                          <a:latin typeface="Cambria Math" panose="02040503050406030204" pitchFamily="18" charset="0"/>
+                        </a:rPr>
+                        <m:t>𝟗</m:t>
+                      </m:r>
+                      <m:r>
+                        <a:rPr lang="ar-AE" b="1">
+                          <a:solidFill>
+                            <a:srgbClr val="FF0000"/>
+                          </a:solidFill>
+                          <a:latin typeface="Cambria Math" panose="02040503050406030204" pitchFamily="18" charset="0"/>
+                        </a:rPr>
+                        <m:t>%</m:t>
+                      </m:r>
+                    </m:oMath>
+                  </m:oMathPara>
+                </a14:m>
+                <a:endParaRPr lang="ar-AE" b="1" dirty="0"/>
+              </a:p>
+              <a:p>
+                <a:endParaRPr lang="en-IN" dirty="0"/>
+              </a:p>
+            </p:txBody>
+          </p:sp>
+        </mc:Choice>
+        <mc:Fallback>
+          <p:sp>
+            <p:nvSpPr>
+              <p:cNvPr id="8" name="TextBox 7">
+                <a:extLst>
+                  <a:ext uri="{FF2B5EF4-FFF2-40B4-BE49-F238E27FC236}">
+                    <a16:creationId xmlns:a16="http://schemas.microsoft.com/office/drawing/2014/main" id="{0BC5E8AA-5F62-93A5-FEB1-4D9B5263CBF0}"/>
+                  </a:ext>
+                </a:extLst>
+              </p:cNvPr>
+              <p:cNvSpPr txBox="1">
+                <a:spLocks noRot="1" noChangeAspect="1" noMove="1" noResize="1" noEditPoints="1" noAdjustHandles="1" noChangeArrowheads="1" noChangeShapeType="1" noTextEdit="1"/>
+              </p:cNvSpPr>
+              <p:nvPr/>
+            </p:nvSpPr>
+            <p:spPr>
+              <a:xfrm>
+                <a:off x="835741" y="5102942"/>
+                <a:ext cx="10844981" cy="1268681"/>
+              </a:xfrm>
+              <a:prstGeom prst="rect">
+                <a:avLst/>
+              </a:prstGeom>
+              <a:blipFill>
+                <a:blip r:embed="rId2"/>
+                <a:stretch>
+                  <a:fillRect l="-450" t="-1923"/>
+                </a:stretch>
+              </a:blipFill>
+            </p:spPr>
+            <p:txBody>
+              <a:bodyPr/>
+              <a:lstStyle/>
+              <a:p>
+                <a:r>
+                  <a:rPr lang="en-US">
+                    <a:noFill/>
+                  </a:rPr>
+                  <a:t> </a:t>
+                </a:r>
+              </a:p>
+            </p:txBody>
+          </p:sp>
+        </mc:Fallback>
+      </mc:AlternateContent>
+      <p:sp>
+        <p:nvSpPr>
+          <p:cNvPr id="3" name="Content Placeholder 2">
+            <a:extLst>
+              <a:ext uri="{FF2B5EF4-FFF2-40B4-BE49-F238E27FC236}">
+                <a16:creationId xmlns:a16="http://schemas.microsoft.com/office/drawing/2014/main" id="{82D7AF5D-1AE8-3C3D-9F1B-2028F8D23896}"/>
+              </a:ext>
+            </a:extLst>
+          </p:cNvPr>
+          <p:cNvSpPr>
+            <a:spLocks noGrp="1"/>
+          </p:cNvSpPr>
+          <p:nvPr>
+            <p:ph sz="quarter" idx="14"/>
+          </p:nvPr>
+        </p:nvSpPr>
+        <p:spPr>
+          <a:xfrm>
+            <a:off x="731520" y="1380743"/>
+            <a:ext cx="11214674" cy="4990879"/>
+          </a:xfrm>
+        </p:spPr>
+        <p:txBody>
+          <a:bodyPr/>
+          <a:lstStyle/>
+          <a:p>
+            <a:endParaRPr lang="en-US" dirty="0"/>
+          </a:p>
+        </p:txBody>
+      </p:sp>
+      <p:pic>
+        <p:nvPicPr>
+          <p:cNvPr id="5" name="Picture 4">
+            <a:extLst>
+              <a:ext uri="{FF2B5EF4-FFF2-40B4-BE49-F238E27FC236}">
+                <a16:creationId xmlns:a16="http://schemas.microsoft.com/office/drawing/2014/main" id="{719786A0-D1D6-6078-92C7-81F0043F8500}"/>
+              </a:ext>
+            </a:extLst>
+          </p:cNvPr>
+          <p:cNvPicPr>
+            <a:picLocks noChangeAspect="1"/>
+          </p:cNvPicPr>
+          <p:nvPr/>
+        </p:nvPicPr>
+        <p:blipFill>
+          <a:blip r:embed="rId3"/>
+          <a:stretch>
+            <a:fillRect/>
+          </a:stretch>
+        </p:blipFill>
+        <p:spPr>
+          <a:xfrm>
+            <a:off x="245806" y="67621"/>
+            <a:ext cx="11661059" cy="4653018"/>
+          </a:xfrm>
+          <a:prstGeom prst="rect">
+            <a:avLst/>
+          </a:prstGeom>
+        </p:spPr>
+      </p:pic>
+    </p:spTree>
+    <p:extLst>
+      <p:ext uri="{BB962C8B-B14F-4D97-AF65-F5344CB8AC3E}">
+        <p14:creationId xmlns:p14="http://schemas.microsoft.com/office/powerpoint/2010/main" val="792552890"/>
+      </p:ext>
+    </p:extLst>
+  </p:cSld>
+  <p:clrMapOvr>
+    <a:masterClrMapping/>
+  </p:clrMapOvr>
+</p:sld>
+</file>
+
+<file path=ppt/slides/slide27.xml><?xml version="1.0" encoding="utf-8"?>
 <p:sld xmlns:a="http://schemas.openxmlformats.org/drawingml/2006/main" xmlns:r="http://schemas.openxmlformats.org/officeDocument/2006/relationships" xmlns:p="http://schemas.openxmlformats.org/presentationml/2006/main">
   <p:cSld>
     <p:spTree>
@@ -41816,7 +42126,7 @@
 </p:sld>
 </file>
 
-<file path=ppt/slides/slide27.xml><?xml version="1.0" encoding="utf-8"?>
+<file path=ppt/slides/slide28.xml><?xml version="1.0" encoding="utf-8"?>
 <p:sld xmlns:a="http://schemas.openxmlformats.org/drawingml/2006/main" xmlns:r="http://schemas.openxmlformats.org/officeDocument/2006/relationships" xmlns:p="http://schemas.openxmlformats.org/presentationml/2006/main">
   <p:cSld>
     <p:spTree>
@@ -42700,7 +43010,7 @@
         </p:nvGraphicFramePr>
         <p:xfrm>
           <a:off x="437115" y="1883189"/>
-          <a:ext cx="9295894" cy="2579969"/>
+          <a:ext cx="9295894" cy="2420392"/>
         </p:xfrm>
         <a:graphic>
           <a:graphicData uri="http://schemas.openxmlformats.org/drawingml/2006/table">
@@ -45899,7 +46209,7 @@
         </p:nvGraphicFramePr>
         <p:xfrm>
           <a:off x="508000" y="2247900"/>
-          <a:ext cx="11225272" cy="4183330"/>
+          <a:ext cx="11225272" cy="3390723"/>
         </p:xfrm>
         <a:graphic>
           <a:graphicData uri="http://schemas.openxmlformats.org/drawingml/2006/table">
@@ -47447,26 +47757,6 @@
 </file>
 
 <file path=customXml/item1.xml><?xml version="1.0" encoding="utf-8"?>
-<p:properties xmlns:p="http://schemas.microsoft.com/office/2006/metadata/properties" xmlns:xsi="http://www.w3.org/2001/XMLSchema-instance" xmlns:pc="http://schemas.microsoft.com/office/infopath/2007/PartnerControls">
-  <documentManagement>
-    <_ip_UnifiedCompliancePolicyUIAction xmlns="http://schemas.microsoft.com/sharepoint/v3" xsi:nil="true"/>
-    <Image xmlns="71af3243-3dd4-4a8d-8c0d-dd76da1f02a5">
-      <Url xsi:nil="true"/>
-      <Description xsi:nil="true"/>
-    </Image>
-    <Status xmlns="71af3243-3dd4-4a8d-8c0d-dd76da1f02a5">Not started</Status>
-    <Background xmlns="71af3243-3dd4-4a8d-8c0d-dd76da1f02a5">false</Background>
-    <_ip_UnifiedCompliancePolicyProperties xmlns="http://schemas.microsoft.com/sharepoint/v3" xsi:nil="true"/>
-    <ImageTagsTaxHTField xmlns="71af3243-3dd4-4a8d-8c0d-dd76da1f02a5">
-      <Terms xmlns="http://schemas.microsoft.com/office/infopath/2007/PartnerControls"/>
-    </ImageTagsTaxHTField>
-    <TaxCatchAll xmlns="230e9df3-be65-4c73-a93b-d1236ebd677e" xsi:nil="true"/>
-    <MediaServiceKeyPoints xmlns="71af3243-3dd4-4a8d-8c0d-dd76da1f02a5" xsi:nil="true"/>
-  </documentManagement>
-</p:properties>
-</file>
-
-<file path=customXml/item2.xml><?xml version="1.0" encoding="utf-8"?>
 <ct:contentTypeSchema xmlns:ct="http://schemas.microsoft.com/office/2006/metadata/contentType" xmlns:ma="http://schemas.microsoft.com/office/2006/metadata/properties/metaAttributes" ct:_="" ma:_="" ma:contentTypeName="Document" ma:contentTypeID="0x01010079F111ED35F8CC479449609E8A0923A6" ma:contentTypeVersion="30" ma:contentTypeDescription="Create a new document." ma:contentTypeScope="" ma:versionID="cec0622158e8f13124e9e8fd4de31bd1">
   <xsd:schema xmlns:xsd="http://www.w3.org/2001/XMLSchema" xmlns:xs="http://www.w3.org/2001/XMLSchema" xmlns:p="http://schemas.microsoft.com/office/2006/metadata/properties" xmlns:ns1="http://schemas.microsoft.com/sharepoint/v3" xmlns:ns2="71af3243-3dd4-4a8d-8c0d-dd76da1f02a5" xmlns:ns3="16c05727-aa75-4e4a-9b5f-8a80a1165891" xmlns:ns4="230e9df3-be65-4c73-a93b-d1236ebd677e" targetNamespace="http://schemas.microsoft.com/office/2006/metadata/properties" ma:root="true" ma:fieldsID="3b52f30ab005d15df08657af532e6e38" ns1:_="" ns2:_="" ns3:_="" ns4:_="">
     <xsd:import namespace="http://schemas.microsoft.com/sharepoint/v3"/>
@@ -47784,6 +48074,26 @@
 </ct:contentTypeSchema>
 </file>
 
+<file path=customXml/item2.xml><?xml version="1.0" encoding="utf-8"?>
+<p:properties xmlns:p="http://schemas.microsoft.com/office/2006/metadata/properties" xmlns:xsi="http://www.w3.org/2001/XMLSchema-instance" xmlns:pc="http://schemas.microsoft.com/office/infopath/2007/PartnerControls">
+  <documentManagement>
+    <_ip_UnifiedCompliancePolicyUIAction xmlns="http://schemas.microsoft.com/sharepoint/v3" xsi:nil="true"/>
+    <Image xmlns="71af3243-3dd4-4a8d-8c0d-dd76da1f02a5">
+      <Url xsi:nil="true"/>
+      <Description xsi:nil="true"/>
+    </Image>
+    <Status xmlns="71af3243-3dd4-4a8d-8c0d-dd76da1f02a5">Not started</Status>
+    <Background xmlns="71af3243-3dd4-4a8d-8c0d-dd76da1f02a5">false</Background>
+    <_ip_UnifiedCompliancePolicyProperties xmlns="http://schemas.microsoft.com/sharepoint/v3" xsi:nil="true"/>
+    <ImageTagsTaxHTField xmlns="71af3243-3dd4-4a8d-8c0d-dd76da1f02a5">
+      <Terms xmlns="http://schemas.microsoft.com/office/infopath/2007/PartnerControls"/>
+    </ImageTagsTaxHTField>
+    <TaxCatchAll xmlns="230e9df3-be65-4c73-a93b-d1236ebd677e" xsi:nil="true"/>
+    <MediaServiceKeyPoints xmlns="71af3243-3dd4-4a8d-8c0d-dd76da1f02a5" xsi:nil="true"/>
+  </documentManagement>
+</p:properties>
+</file>
+
 <file path=customXml/item3.xml><?xml version="1.0" encoding="utf-8"?>
 <?mso-contentType ?>
 <FormTemplates xmlns="http://schemas.microsoft.com/sharepoint/v3/contenttype/forms">
@@ -47794,18 +48104,6 @@
 </file>
 
 <file path=customXml/itemProps1.xml><?xml version="1.0" encoding="utf-8"?>
-<ds:datastoreItem xmlns:ds="http://schemas.openxmlformats.org/officeDocument/2006/customXml" ds:itemID="{5604CAC9-4DB9-48D9-8A6F-3675D14127D6}">
-  <ds:schemaRefs>
-    <ds:schemaRef ds:uri="230e9df3-be65-4c73-a93b-d1236ebd677e"/>
-    <ds:schemaRef ds:uri="71af3243-3dd4-4a8d-8c0d-dd76da1f02a5"/>
-    <ds:schemaRef ds:uri="http://schemas.microsoft.com/office/2006/metadata/properties"/>
-    <ds:schemaRef ds:uri="http://schemas.microsoft.com/office/infopath/2007/PartnerControls"/>
-    <ds:schemaRef ds:uri="http://schemas.microsoft.com/sharepoint/v3"/>
-  </ds:schemaRefs>
-</ds:datastoreItem>
-</file>
-
-<file path=customXml/itemProps2.xml><?xml version="1.0" encoding="utf-8"?>
 <ds:datastoreItem xmlns:ds="http://schemas.openxmlformats.org/officeDocument/2006/customXml" ds:itemID="{5D279CDD-1FB7-427E-9208-ECF0EB941AD6}">
   <ds:schemaRefs>
     <ds:schemaRef ds:uri="16c05727-aa75-4e4a-9b5f-8a80a1165891"/>
@@ -47826,6 +48124,18 @@
 </ds:datastoreItem>
 </file>
 
+<file path=customXml/itemProps2.xml><?xml version="1.0" encoding="utf-8"?>
+<ds:datastoreItem xmlns:ds="http://schemas.openxmlformats.org/officeDocument/2006/customXml" ds:itemID="{5604CAC9-4DB9-48D9-8A6F-3675D14127D6}">
+  <ds:schemaRefs>
+    <ds:schemaRef ds:uri="230e9df3-be65-4c73-a93b-d1236ebd677e"/>
+    <ds:schemaRef ds:uri="71af3243-3dd4-4a8d-8c0d-dd76da1f02a5"/>
+    <ds:schemaRef ds:uri="http://schemas.microsoft.com/office/2006/metadata/properties"/>
+    <ds:schemaRef ds:uri="http://schemas.microsoft.com/office/infopath/2007/PartnerControls"/>
+    <ds:schemaRef ds:uri="http://schemas.microsoft.com/sharepoint/v3"/>
+  </ds:schemaRefs>
+</ds:datastoreItem>
+</file>
+
 <file path=customXml/itemProps3.xml><?xml version="1.0" encoding="utf-8"?>
 <ds:datastoreItem xmlns:ds="http://schemas.openxmlformats.org/officeDocument/2006/customXml" ds:itemID="{1E753F6F-88D8-493D-A089-0923419088E5}">
   <ds:schemaRefs>

</xml_diff>